<commit_message>
Fixed a coding mistake on the class 3 slides
</commit_message>
<xml_diff>
--- a/slides/Pythonlearn-03-Loops.pptx
+++ b/slides/Pythonlearn-03-Loops.pptx
@@ -24921,78 +24921,6 @@
               </a:rPr>
               <a:t>ry: </a:t>
             </a:r>
-            <a:r>
-              <a:rPr lang="en-US" sz="3000" i="0" u="none" strike="noStrike" cap="none" dirty="0">
-                <a:solidFill>
-                  <a:srgbClr val="00FF00"/>
-                </a:solidFill>
-                <a:latin typeface="Courier"/>
-                <a:ea typeface="Courier"/>
-                <a:cs typeface="Courier"/>
-                <a:sym typeface="Courier New"/>
-              </a:rPr>
-              <a:t>n</a:t>
-            </a:r>
-            <a:r>
-              <a:rPr lang="en-US" sz="3000" i="0" u="none" strike="noStrike" cap="none" dirty="0">
-                <a:solidFill>
-                  <a:srgbClr val="FFFF00"/>
-                </a:solidFill>
-                <a:latin typeface="Courier"/>
-                <a:ea typeface="Courier"/>
-                <a:cs typeface="Courier"/>
-                <a:sym typeface="Courier New"/>
-              </a:rPr>
-              <a:t> </a:t>
-            </a:r>
-            <a:r>
-              <a:rPr lang="en-US" sz="3000" i="0" u="none" strike="noStrike" cap="none" dirty="0">
-                <a:solidFill>
-                  <a:srgbClr val="00FFFF"/>
-                </a:solidFill>
-                <a:latin typeface="Courier"/>
-                <a:ea typeface="Courier"/>
-                <a:cs typeface="Courier"/>
-                <a:sym typeface="Courier New"/>
-              </a:rPr>
-              <a:t>&gt;</a:t>
-            </a:r>
-            <a:r>
-              <a:rPr lang="en-US" sz="3000" i="0" u="none" strike="noStrike" cap="none" dirty="0">
-                <a:solidFill>
-                  <a:srgbClr val="FFFF00"/>
-                </a:solidFill>
-                <a:latin typeface="Courier"/>
-                <a:ea typeface="Courier"/>
-                <a:cs typeface="Courier"/>
-                <a:sym typeface="Courier New"/>
-              </a:rPr>
-              <a:t> </a:t>
-            </a:r>
-            <a:r>
-              <a:rPr lang="en-US" sz="3000" i="0" u="none" strike="noStrike" cap="none" dirty="0">
-                <a:solidFill>
-                  <a:srgbClr val="FF9900"/>
-                </a:solidFill>
-                <a:latin typeface="Courier"/>
-                <a:ea typeface="Courier"/>
-                <a:cs typeface="Courier"/>
-                <a:sym typeface="Courier New"/>
-              </a:rPr>
-              <a:t>0</a:t>
-            </a:r>
-            <a:r>
-              <a:rPr lang="en-US" sz="3000" i="0" u="none" strike="noStrike" cap="none" dirty="0">
-                <a:solidFill>
-                  <a:srgbClr val="FFFF00"/>
-                </a:solidFill>
-                <a:latin typeface="Courier"/>
-                <a:ea typeface="Courier"/>
-                <a:cs typeface="Courier"/>
-                <a:sym typeface="Courier New"/>
-              </a:rPr>
-              <a:t> :</a:t>
-            </a:r>
           </a:p>
           <a:p>
             <a:pPr marL="0" marR="0" lvl="0" indent="0" algn="l" rtl="0">

</xml_diff>